<commit_message>
Added link to MS GitHub samples
</commit_message>
<xml_diff>
--- a/Extending Visual Studio and Making It Work for You.pptx
+++ b/Extending Visual Studio and Making It Work for You.pptx
@@ -261,7 +261,7 @@
               <a:rPr lang="en-US" smtClean="0">
                 <a:latin typeface="Segoe UI" pitchFamily="34" charset="0"/>
               </a:rPr>
-              <a:t>3/11/2016 9:52 PM</a:t>
+              <a:t>3/12/2016 9:52 AM</a:t>
             </a:fld>
             <a:endParaRPr lang="en-US" dirty="0">
               <a:latin typeface="Segoe UI" pitchFamily="34" charset="0"/>
@@ -542,7 +542,7 @@
           <a:p>
             <a:fld id="{2DFDA5C7-BBAE-481E-8BF7-731156A2E2C1}" type="datetime8">
               <a:rPr lang="en-US" smtClean="0"/>
-              <a:t>3/11/2016 9:52 PM</a:t>
+              <a:t>3/12/2016 9:52 AM</a:t>
             </a:fld>
             <a:endParaRPr lang="en-US" dirty="0"/>
           </a:p>
@@ -937,7 +937,7 @@
           <a:p>
             <a:fld id="{2DFDA5C7-BBAE-481E-8BF7-731156A2E2C1}" type="datetime8">
               <a:rPr lang="en-US" smtClean="0"/>
-              <a:t>3/11/2016 9:52 PM</a:t>
+              <a:t>3/12/2016 9:52 AM</a:t>
             </a:fld>
             <a:endParaRPr lang="en-US" dirty="0"/>
           </a:p>
@@ -1130,7 +1130,7 @@
           <a:p>
             <a:fld id="{2DFDA5C7-BBAE-481E-8BF7-731156A2E2C1}" type="datetime8">
               <a:rPr lang="en-US" smtClean="0"/>
-              <a:t>3/11/2016 9:52 PM</a:t>
+              <a:t>3/12/2016 9:52 AM</a:t>
             </a:fld>
             <a:endParaRPr lang="en-US" dirty="0"/>
           </a:p>
@@ -1323,7 +1323,7 @@
           <a:p>
             <a:fld id="{2DFDA5C7-BBAE-481E-8BF7-731156A2E2C1}" type="datetime8">
               <a:rPr lang="en-US" smtClean="0"/>
-              <a:t>3/11/2016 9:52 PM</a:t>
+              <a:t>3/12/2016 9:52 AM</a:t>
             </a:fld>
             <a:endParaRPr lang="en-US" dirty="0"/>
           </a:p>
@@ -1520,7 +1520,7 @@
           <a:p>
             <a:fld id="{2DFDA5C7-BBAE-481E-8BF7-731156A2E2C1}" type="datetime8">
               <a:rPr lang="en-US" smtClean="0"/>
-              <a:t>3/11/2016 9:52 PM</a:t>
+              <a:t>3/12/2016 9:52 AM</a:t>
             </a:fld>
             <a:endParaRPr lang="en-US" dirty="0"/>
           </a:p>
@@ -1708,7 +1708,7 @@
           <a:p>
             <a:fld id="{2DFDA5C7-BBAE-481E-8BF7-731156A2E2C1}" type="datetime8">
               <a:rPr lang="en-US" smtClean="0"/>
-              <a:t>3/11/2016 9:52 PM</a:t>
+              <a:t>3/12/2016 9:52 AM</a:t>
             </a:fld>
             <a:endParaRPr lang="en-US" dirty="0"/>
           </a:p>
@@ -1913,7 +1913,7 @@
           <a:p>
             <a:fld id="{2DFDA5C7-BBAE-481E-8BF7-731156A2E2C1}" type="datetime8">
               <a:rPr lang="en-US" smtClean="0"/>
-              <a:t>3/11/2016 9:52 PM</a:t>
+              <a:t>3/12/2016 9:52 AM</a:t>
             </a:fld>
             <a:endParaRPr lang="en-US" dirty="0"/>
           </a:p>
@@ -6551,6 +6551,13 @@
   <p:transition>
     <p:fade/>
   </p:transition>
+  <p:timing>
+    <p:tnLst>
+      <p:par>
+        <p:cTn id="1" dur="indefinite" restart="never" nodeType="tmRoot"/>
+      </p:par>
+    </p:tnLst>
+  </p:timing>
 </p:sld>
 </file>
 
@@ -6685,6 +6692,13 @@
   <p:transition>
     <p:fade/>
   </p:transition>
+  <p:timing>
+    <p:tnLst>
+      <p:par>
+        <p:cTn id="1" dur="indefinite" restart="never" nodeType="tmRoot"/>
+      </p:par>
+    </p:tnLst>
+  </p:timing>
 </p:sld>
 </file>
 
@@ -6802,6 +6816,13 @@
   <p:transition>
     <p:fade/>
   </p:transition>
+  <p:timing>
+    <p:tnLst>
+      <p:par>
+        <p:cTn id="1" dur="indefinite" restart="never" nodeType="tmRoot"/>
+      </p:par>
+    </p:tnLst>
+  </p:timing>
 </p:sld>
 </file>
 
@@ -6943,6 +6964,13 @@
   <p:transition>
     <p:fade/>
   </p:transition>
+  <p:timing>
+    <p:tnLst>
+      <p:par>
+        <p:cTn id="1" dur="indefinite" restart="never" nodeType="tmRoot"/>
+      </p:par>
+    </p:tnLst>
+  </p:timing>
 </p:sld>
 </file>
 
@@ -6998,7 +7026,7 @@
         <p:spPr>
           <a:xfrm>
             <a:off x="274638" y="1214438"/>
-            <a:ext cx="11887200" cy="3040832"/>
+            <a:ext cx="11887200" cy="4124206"/>
           </a:xfrm>
         </p:spPr>
         <p:txBody>
@@ -7032,7 +7060,39 @@
               <a:rPr lang="en-US" dirty="0">
                 <a:hlinkClick r:id="rId3"/>
               </a:rPr>
-              <a:t>http://www.visualstudioextensibility.com</a:t>
+              <a:t>http://</a:t>
+            </a:r>
+            <a:r>
+              <a:rPr lang="en-US" dirty="0" smtClean="0">
+                <a:hlinkClick r:id="rId3"/>
+              </a:rPr>
+              <a:t>www.visualstudioextensibility.com</a:t>
+            </a:r>
+            <a:endParaRPr lang="en-US" dirty="0" smtClean="0"/>
+          </a:p>
+          <a:p>
+            <a:r>
+              <a:rPr lang="en-US" dirty="0" smtClean="0"/>
+              <a:t>Microsoft Samples</a:t>
+            </a:r>
+          </a:p>
+          <a:p>
+            <a:pPr lvl="1"/>
+            <a:r>
+              <a:rPr lang="en-US">
+                <a:hlinkClick r:id="rId4"/>
+              </a:rPr>
+              <a:t>https://</a:t>
+            </a:r>
+            <a:r>
+              <a:rPr lang="en-US" smtClean="0">
+                <a:hlinkClick r:id="rId4"/>
+              </a:rPr>
+              <a:t>github.com/Microsoft/VSSDK-Extensibility-Samples</a:t>
+            </a:r>
+            <a:r>
+              <a:rPr lang="en-US" smtClean="0"/>
+              <a:t> </a:t>
             </a:r>
             <a:endParaRPr lang="en-US" dirty="0"/>
           </a:p>
@@ -7059,6 +7119,13 @@
   <p:transition>
     <p:fade/>
   </p:transition>
+  <p:timing>
+    <p:tnLst>
+      <p:par>
+        <p:cTn id="1" dur="indefinite" restart="never" nodeType="tmRoot"/>
+      </p:par>
+    </p:tnLst>
+  </p:timing>
 </p:sld>
 </file>
 
@@ -7492,6 +7559,13 @@
   <p:transition>
     <p:fade/>
   </p:transition>
+  <p:timing>
+    <p:tnLst>
+      <p:par>
+        <p:cTn id="1" dur="indefinite" restart="never" nodeType="tmRoot"/>
+      </p:par>
+    </p:tnLst>
+  </p:timing>
 </p:sld>
 </file>
 
@@ -7616,6 +7690,13 @@
   <p:transition>
     <p:fade/>
   </p:transition>
+  <p:timing>
+    <p:tnLst>
+      <p:par>
+        <p:cTn id="1" dur="indefinite" restart="never" nodeType="tmRoot"/>
+      </p:par>
+    </p:tnLst>
+  </p:timing>
 </p:sld>
 </file>
 
@@ -7737,6 +7818,13 @@
   <p:transition>
     <p:fade/>
   </p:transition>
+  <p:timing>
+    <p:tnLst>
+      <p:par>
+        <p:cTn id="1" dur="indefinite" restart="never" nodeType="tmRoot"/>
+      </p:par>
+    </p:tnLst>
+  </p:timing>
 </p:sld>
 </file>
 
@@ -7946,6 +8034,13 @@
   <p:transition>
     <p:fade/>
   </p:transition>
+  <p:timing>
+    <p:tnLst>
+      <p:par>
+        <p:cTn id="1" dur="indefinite" restart="never" nodeType="tmRoot"/>
+      </p:par>
+    </p:tnLst>
+  </p:timing>
 </p:sld>
 </file>
 
@@ -8103,6 +8198,13 @@
   <p:transition>
     <p:fade/>
   </p:transition>
+  <p:timing>
+    <p:tnLst>
+      <p:par>
+        <p:cTn id="1" dur="indefinite" restart="never" nodeType="tmRoot"/>
+      </p:par>
+    </p:tnLst>
+  </p:timing>
 </p:sld>
 </file>
 
@@ -8277,6 +8379,13 @@
   <p:transition>
     <p:fade/>
   </p:transition>
+  <p:timing>
+    <p:tnLst>
+      <p:par>
+        <p:cTn id="1" dur="indefinite" restart="never" nodeType="tmRoot"/>
+      </p:par>
+    </p:tnLst>
+  </p:timing>
 </p:sld>
 </file>
 
@@ -8371,6 +8480,13 @@
   <p:transition>
     <p:fade/>
   </p:transition>
+  <p:timing>
+    <p:tnLst>
+      <p:par>
+        <p:cTn id="1" dur="indefinite" restart="never" nodeType="tmRoot"/>
+      </p:par>
+    </p:tnLst>
+  </p:timing>
 </p:sld>
 </file>
 
@@ -8499,6 +8615,13 @@
   <p:transition>
     <p:fade/>
   </p:transition>
+  <p:timing>
+    <p:tnLst>
+      <p:par>
+        <p:cTn id="1" dur="indefinite" restart="never" nodeType="tmRoot"/>
+      </p:par>
+    </p:tnLst>
+  </p:timing>
 </p:sld>
 </file>
 

</xml_diff>